<commit_message>
Correção dos slides da aula 01
</commit_message>
<xml_diff>
--- a/Aula01-Ambiente de Desenvolvimento/Aula01-Ambiente de Desenvolvimento Flutter.pptx
+++ b/Aula01-Ambiente de Desenvolvimento/Aula01-Ambiente de Desenvolvimento Flutter.pptx
@@ -19,30 +19,30 @@
   <p:notesSz cx="6858000" cy="9144000"/>
   <p:embeddedFontLst>
     <p:embeddedFont>
-      <p:font typeface="Poppins Bold" panose="020B0604020202020204" charset="0"/>
+      <p:font typeface="Calibri" panose="020F0502020204030204" pitchFamily="34" charset="0"/>
       <p:regular r:id="rId11"/>
+      <p:bold r:id="rId12"/>
+      <p:italic r:id="rId13"/>
+      <p:boldItalic r:id="rId14"/>
     </p:embeddedFont>
     <p:embeddedFont>
-      <p:font typeface="Calibri" panose="020F0502020204030204" pitchFamily="34" charset="0"/>
-      <p:regular r:id="rId12"/>
-      <p:bold r:id="rId13"/>
-      <p:italic r:id="rId14"/>
-      <p:boldItalic r:id="rId15"/>
+      <p:font typeface="Lato" panose="020F0502020204030203" pitchFamily="34" charset="0"/>
+      <p:regular r:id="rId15"/>
     </p:embeddedFont>
     <p:embeddedFont>
-      <p:font typeface="Lato" panose="020B0604020202020204" charset="0"/>
+      <p:font typeface="Lato Bold" panose="020F0502020204030203" pitchFamily="34" charset="0"/>
       <p:regular r:id="rId16"/>
     </p:embeddedFont>
     <p:embeddedFont>
-      <p:font typeface="Poppins Ultra-Bold" panose="020B0604020202020204" charset="0"/>
+      <p:font typeface="Poppins" panose="020B0502040504020204" pitchFamily="34" charset="0"/>
       <p:regular r:id="rId17"/>
     </p:embeddedFont>
     <p:embeddedFont>
-      <p:font typeface="Poppins" panose="020B0604020202020204" charset="0"/>
+      <p:font typeface="Poppins Bold" pitchFamily="2" charset="0"/>
       <p:regular r:id="rId18"/>
     </p:embeddedFont>
     <p:embeddedFont>
-      <p:font typeface="Lato Bold" panose="020B0604020202020204" charset="0"/>
+      <p:font typeface="Poppins Ultra-Bold" pitchFamily="2" charset="0"/>
       <p:regular r:id="rId19"/>
     </p:embeddedFont>
   </p:embeddedFontLst>
@@ -198,10 +198,9 @@
           <a:lstStyle/>
           <a:p>
             <a:r>
-              <a:rPr lang="en-US" smtClean="0"/>
+              <a:rPr lang="en-US"/>
               <a:t>Click to edit Master title style</a:t>
             </a:r>
-            <a:endParaRPr lang="en-US"/>
           </a:p>
         </p:txBody>
       </p:sp>
@@ -317,10 +316,9 @@
           </a:lstStyle>
           <a:p>
             <a:r>
-              <a:rPr lang="en-US" smtClean="0"/>
+              <a:rPr lang="en-US"/>
               <a:t>Click to edit Master subtitle style</a:t>
             </a:r>
-            <a:endParaRPr lang="en-US"/>
           </a:p>
         </p:txBody>
       </p:sp>
@@ -342,7 +340,7 @@
             <a:fld id="{1D8BD707-D9CF-40AE-B4C6-C98DA3205C09}" type="datetimeFigureOut">
               <a:rPr lang="en-US" smtClean="0"/>
               <a:pPr/>
-              <a:t>3/1/2024</a:t>
+              <a:t>3/2/2024</a:t>
             </a:fld>
             <a:endParaRPr lang="en-US"/>
           </a:p>
@@ -432,10 +430,9 @@
           <a:lstStyle/>
           <a:p>
             <a:r>
-              <a:rPr lang="en-US" smtClean="0"/>
+              <a:rPr lang="en-US"/>
               <a:t>Click to edit Master title style</a:t>
             </a:r>
-            <a:endParaRPr lang="en-US"/>
           </a:p>
         </p:txBody>
       </p:sp>
@@ -456,38 +453,37 @@
           <a:p>
             <a:pPr lvl="0"/>
             <a:r>
-              <a:rPr lang="en-US" smtClean="0"/>
+              <a:rPr lang="en-US"/>
               <a:t>Click to edit Master text styles</a:t>
             </a:r>
           </a:p>
           <a:p>
             <a:pPr lvl="1"/>
             <a:r>
-              <a:rPr lang="en-US" smtClean="0"/>
+              <a:rPr lang="en-US"/>
               <a:t>Second level</a:t>
             </a:r>
           </a:p>
           <a:p>
             <a:pPr lvl="2"/>
             <a:r>
-              <a:rPr lang="en-US" smtClean="0"/>
+              <a:rPr lang="en-US"/>
               <a:t>Third level</a:t>
             </a:r>
           </a:p>
           <a:p>
             <a:pPr lvl="3"/>
             <a:r>
-              <a:rPr lang="en-US" smtClean="0"/>
+              <a:rPr lang="en-US"/>
               <a:t>Fourth level</a:t>
             </a:r>
           </a:p>
           <a:p>
             <a:pPr lvl="4"/>
             <a:r>
-              <a:rPr lang="en-US" smtClean="0"/>
+              <a:rPr lang="en-US"/>
               <a:t>Fifth level</a:t>
             </a:r>
-            <a:endParaRPr lang="en-US"/>
           </a:p>
         </p:txBody>
       </p:sp>
@@ -509,7 +505,7 @@
             <a:fld id="{1D8BD707-D9CF-40AE-B4C6-C98DA3205C09}" type="datetimeFigureOut">
               <a:rPr lang="en-US" smtClean="0"/>
               <a:pPr/>
-              <a:t>3/1/2024</a:t>
+              <a:t>3/2/2024</a:t>
             </a:fld>
             <a:endParaRPr lang="en-US"/>
           </a:p>
@@ -604,10 +600,9 @@
           <a:lstStyle/>
           <a:p>
             <a:r>
-              <a:rPr lang="en-US" smtClean="0"/>
+              <a:rPr lang="en-US"/>
               <a:t>Click to edit Master title style</a:t>
             </a:r>
-            <a:endParaRPr lang="en-US"/>
           </a:p>
         </p:txBody>
       </p:sp>
@@ -633,38 +628,37 @@
           <a:p>
             <a:pPr lvl="0"/>
             <a:r>
-              <a:rPr lang="en-US" smtClean="0"/>
+              <a:rPr lang="en-US"/>
               <a:t>Click to edit Master text styles</a:t>
             </a:r>
           </a:p>
           <a:p>
             <a:pPr lvl="1"/>
             <a:r>
-              <a:rPr lang="en-US" smtClean="0"/>
+              <a:rPr lang="en-US"/>
               <a:t>Second level</a:t>
             </a:r>
           </a:p>
           <a:p>
             <a:pPr lvl="2"/>
             <a:r>
-              <a:rPr lang="en-US" smtClean="0"/>
+              <a:rPr lang="en-US"/>
               <a:t>Third level</a:t>
             </a:r>
           </a:p>
           <a:p>
             <a:pPr lvl="3"/>
             <a:r>
-              <a:rPr lang="en-US" smtClean="0"/>
+              <a:rPr lang="en-US"/>
               <a:t>Fourth level</a:t>
             </a:r>
           </a:p>
           <a:p>
             <a:pPr lvl="4"/>
             <a:r>
-              <a:rPr lang="en-US" smtClean="0"/>
+              <a:rPr lang="en-US"/>
               <a:t>Fifth level</a:t>
             </a:r>
-            <a:endParaRPr lang="en-US"/>
           </a:p>
         </p:txBody>
       </p:sp>
@@ -686,7 +680,7 @@
             <a:fld id="{1D8BD707-D9CF-40AE-B4C6-C98DA3205C09}" type="datetimeFigureOut">
               <a:rPr lang="en-US" smtClean="0"/>
               <a:pPr/>
-              <a:t>3/1/2024</a:t>
+              <a:t>3/2/2024</a:t>
             </a:fld>
             <a:endParaRPr lang="en-US"/>
           </a:p>
@@ -776,10 +770,9 @@
           <a:lstStyle/>
           <a:p>
             <a:r>
-              <a:rPr lang="en-US" smtClean="0"/>
+              <a:rPr lang="en-US"/>
               <a:t>Click to edit Master title style</a:t>
             </a:r>
-            <a:endParaRPr lang="en-US"/>
           </a:p>
         </p:txBody>
       </p:sp>
@@ -800,38 +793,37 @@
           <a:p>
             <a:pPr lvl="0"/>
             <a:r>
-              <a:rPr lang="en-US" smtClean="0"/>
+              <a:rPr lang="en-US"/>
               <a:t>Click to edit Master text styles</a:t>
             </a:r>
           </a:p>
           <a:p>
             <a:pPr lvl="1"/>
             <a:r>
-              <a:rPr lang="en-US" smtClean="0"/>
+              <a:rPr lang="en-US"/>
               <a:t>Second level</a:t>
             </a:r>
           </a:p>
           <a:p>
             <a:pPr lvl="2"/>
             <a:r>
-              <a:rPr lang="en-US" smtClean="0"/>
+              <a:rPr lang="en-US"/>
               <a:t>Third level</a:t>
             </a:r>
           </a:p>
           <a:p>
             <a:pPr lvl="3"/>
             <a:r>
-              <a:rPr lang="en-US" smtClean="0"/>
+              <a:rPr lang="en-US"/>
               <a:t>Fourth level</a:t>
             </a:r>
           </a:p>
           <a:p>
             <a:pPr lvl="4"/>
             <a:r>
-              <a:rPr lang="en-US" smtClean="0"/>
+              <a:rPr lang="en-US"/>
               <a:t>Fifth level</a:t>
             </a:r>
-            <a:endParaRPr lang="en-US"/>
           </a:p>
         </p:txBody>
       </p:sp>
@@ -853,7 +845,7 @@
             <a:fld id="{1D8BD707-D9CF-40AE-B4C6-C98DA3205C09}" type="datetimeFigureOut">
               <a:rPr lang="en-US" smtClean="0"/>
               <a:pPr/>
-              <a:t>3/1/2024</a:t>
+              <a:t>3/2/2024</a:t>
             </a:fld>
             <a:endParaRPr lang="en-US"/>
           </a:p>
@@ -952,10 +944,9 @@
           </a:lstStyle>
           <a:p>
             <a:r>
-              <a:rPr lang="en-US" smtClean="0"/>
+              <a:rPr lang="en-US"/>
               <a:t>Click to edit Master title style</a:t>
             </a:r>
-            <a:endParaRPr lang="en-US"/>
           </a:p>
         </p:txBody>
       </p:sp>
@@ -1072,7 +1063,7 @@
           <a:p>
             <a:pPr lvl="0"/>
             <a:r>
-              <a:rPr lang="en-US" smtClean="0"/>
+              <a:rPr lang="en-US"/>
               <a:t>Click to edit Master text styles</a:t>
             </a:r>
           </a:p>
@@ -1096,7 +1087,7 @@
             <a:fld id="{1D8BD707-D9CF-40AE-B4C6-C98DA3205C09}" type="datetimeFigureOut">
               <a:rPr lang="en-US" smtClean="0"/>
               <a:pPr/>
-              <a:t>3/1/2024</a:t>
+              <a:t>3/2/2024</a:t>
             </a:fld>
             <a:endParaRPr lang="en-US"/>
           </a:p>
@@ -1186,10 +1177,9 @@
           <a:lstStyle/>
           <a:p>
             <a:r>
-              <a:rPr lang="en-US" smtClean="0"/>
+              <a:rPr lang="en-US"/>
               <a:t>Click to edit Master title style</a:t>
             </a:r>
-            <a:endParaRPr lang="en-US"/>
           </a:p>
         </p:txBody>
       </p:sp>
@@ -1243,38 +1233,37 @@
           <a:p>
             <a:pPr lvl="0"/>
             <a:r>
-              <a:rPr lang="en-US" smtClean="0"/>
+              <a:rPr lang="en-US"/>
               <a:t>Click to edit Master text styles</a:t>
             </a:r>
           </a:p>
           <a:p>
             <a:pPr lvl="1"/>
             <a:r>
-              <a:rPr lang="en-US" smtClean="0"/>
+              <a:rPr lang="en-US"/>
               <a:t>Second level</a:t>
             </a:r>
           </a:p>
           <a:p>
             <a:pPr lvl="2"/>
             <a:r>
-              <a:rPr lang="en-US" smtClean="0"/>
+              <a:rPr lang="en-US"/>
               <a:t>Third level</a:t>
             </a:r>
           </a:p>
           <a:p>
             <a:pPr lvl="3"/>
             <a:r>
-              <a:rPr lang="en-US" smtClean="0"/>
+              <a:rPr lang="en-US"/>
               <a:t>Fourth level</a:t>
             </a:r>
           </a:p>
           <a:p>
             <a:pPr lvl="4"/>
             <a:r>
-              <a:rPr lang="en-US" smtClean="0"/>
+              <a:rPr lang="en-US"/>
               <a:t>Fifth level</a:t>
             </a:r>
-            <a:endParaRPr lang="en-US"/>
           </a:p>
         </p:txBody>
       </p:sp>
@@ -1328,38 +1317,37 @@
           <a:p>
             <a:pPr lvl="0"/>
             <a:r>
-              <a:rPr lang="en-US" smtClean="0"/>
+              <a:rPr lang="en-US"/>
               <a:t>Click to edit Master text styles</a:t>
             </a:r>
           </a:p>
           <a:p>
             <a:pPr lvl="1"/>
             <a:r>
-              <a:rPr lang="en-US" smtClean="0"/>
+              <a:rPr lang="en-US"/>
               <a:t>Second level</a:t>
             </a:r>
           </a:p>
           <a:p>
             <a:pPr lvl="2"/>
             <a:r>
-              <a:rPr lang="en-US" smtClean="0"/>
+              <a:rPr lang="en-US"/>
               <a:t>Third level</a:t>
             </a:r>
           </a:p>
           <a:p>
             <a:pPr lvl="3"/>
             <a:r>
-              <a:rPr lang="en-US" smtClean="0"/>
+              <a:rPr lang="en-US"/>
               <a:t>Fourth level</a:t>
             </a:r>
           </a:p>
           <a:p>
             <a:pPr lvl="4"/>
             <a:r>
-              <a:rPr lang="en-US" smtClean="0"/>
+              <a:rPr lang="en-US"/>
               <a:t>Fifth level</a:t>
             </a:r>
-            <a:endParaRPr lang="en-US"/>
           </a:p>
         </p:txBody>
       </p:sp>
@@ -1381,7 +1369,7 @@
             <a:fld id="{1D8BD707-D9CF-40AE-B4C6-C98DA3205C09}" type="datetimeFigureOut">
               <a:rPr lang="en-US" smtClean="0"/>
               <a:pPr/>
-              <a:t>3/1/2024</a:t>
+              <a:t>3/2/2024</a:t>
             </a:fld>
             <a:endParaRPr lang="en-US"/>
           </a:p>
@@ -1475,10 +1463,9 @@
           </a:lstStyle>
           <a:p>
             <a:r>
-              <a:rPr lang="en-US" smtClean="0"/>
+              <a:rPr lang="en-US"/>
               <a:t>Click to edit Master title style</a:t>
             </a:r>
-            <a:endParaRPr lang="en-US"/>
           </a:p>
         </p:txBody>
       </p:sp>
@@ -1541,7 +1528,7 @@
           <a:p>
             <a:pPr lvl="0"/>
             <a:r>
-              <a:rPr lang="en-US" smtClean="0"/>
+              <a:rPr lang="en-US"/>
               <a:t>Click to edit Master text styles</a:t>
             </a:r>
           </a:p>
@@ -1597,38 +1584,37 @@
           <a:p>
             <a:pPr lvl="0"/>
             <a:r>
-              <a:rPr lang="en-US" smtClean="0"/>
+              <a:rPr lang="en-US"/>
               <a:t>Click to edit Master text styles</a:t>
             </a:r>
           </a:p>
           <a:p>
             <a:pPr lvl="1"/>
             <a:r>
-              <a:rPr lang="en-US" smtClean="0"/>
+              <a:rPr lang="en-US"/>
               <a:t>Second level</a:t>
             </a:r>
           </a:p>
           <a:p>
             <a:pPr lvl="2"/>
             <a:r>
-              <a:rPr lang="en-US" smtClean="0"/>
+              <a:rPr lang="en-US"/>
               <a:t>Third level</a:t>
             </a:r>
           </a:p>
           <a:p>
             <a:pPr lvl="3"/>
             <a:r>
-              <a:rPr lang="en-US" smtClean="0"/>
+              <a:rPr lang="en-US"/>
               <a:t>Fourth level</a:t>
             </a:r>
           </a:p>
           <a:p>
             <a:pPr lvl="4"/>
             <a:r>
-              <a:rPr lang="en-US" smtClean="0"/>
+              <a:rPr lang="en-US"/>
               <a:t>Fifth level</a:t>
             </a:r>
-            <a:endParaRPr lang="en-US"/>
           </a:p>
         </p:txBody>
       </p:sp>
@@ -1691,7 +1677,7 @@
           <a:p>
             <a:pPr lvl="0"/>
             <a:r>
-              <a:rPr lang="en-US" smtClean="0"/>
+              <a:rPr lang="en-US"/>
               <a:t>Click to edit Master text styles</a:t>
             </a:r>
           </a:p>
@@ -1747,38 +1733,37 @@
           <a:p>
             <a:pPr lvl="0"/>
             <a:r>
-              <a:rPr lang="en-US" smtClean="0"/>
+              <a:rPr lang="en-US"/>
               <a:t>Click to edit Master text styles</a:t>
             </a:r>
           </a:p>
           <a:p>
             <a:pPr lvl="1"/>
             <a:r>
-              <a:rPr lang="en-US" smtClean="0"/>
+              <a:rPr lang="en-US"/>
               <a:t>Second level</a:t>
             </a:r>
           </a:p>
           <a:p>
             <a:pPr lvl="2"/>
             <a:r>
-              <a:rPr lang="en-US" smtClean="0"/>
+              <a:rPr lang="en-US"/>
               <a:t>Third level</a:t>
             </a:r>
           </a:p>
           <a:p>
             <a:pPr lvl="3"/>
             <a:r>
-              <a:rPr lang="en-US" smtClean="0"/>
+              <a:rPr lang="en-US"/>
               <a:t>Fourth level</a:t>
             </a:r>
           </a:p>
           <a:p>
             <a:pPr lvl="4"/>
             <a:r>
-              <a:rPr lang="en-US" smtClean="0"/>
+              <a:rPr lang="en-US"/>
               <a:t>Fifth level</a:t>
             </a:r>
-            <a:endParaRPr lang="en-US"/>
           </a:p>
         </p:txBody>
       </p:sp>
@@ -1800,7 +1785,7 @@
             <a:fld id="{1D8BD707-D9CF-40AE-B4C6-C98DA3205C09}" type="datetimeFigureOut">
               <a:rPr lang="en-US" smtClean="0"/>
               <a:pPr/>
-              <a:t>3/1/2024</a:t>
+              <a:t>3/2/2024</a:t>
             </a:fld>
             <a:endParaRPr lang="en-US"/>
           </a:p>
@@ -1890,10 +1875,9 @@
           <a:lstStyle/>
           <a:p>
             <a:r>
-              <a:rPr lang="en-US" smtClean="0"/>
+              <a:rPr lang="en-US"/>
               <a:t>Click to edit Master title style</a:t>
             </a:r>
-            <a:endParaRPr lang="en-US"/>
           </a:p>
         </p:txBody>
       </p:sp>
@@ -1915,7 +1899,7 @@
             <a:fld id="{1D8BD707-D9CF-40AE-B4C6-C98DA3205C09}" type="datetimeFigureOut">
               <a:rPr lang="en-US" smtClean="0"/>
               <a:pPr/>
-              <a:t>3/1/2024</a:t>
+              <a:t>3/2/2024</a:t>
             </a:fld>
             <a:endParaRPr lang="en-US"/>
           </a:p>
@@ -2007,7 +1991,7 @@
             <a:fld id="{1D8BD707-D9CF-40AE-B4C6-C98DA3205C09}" type="datetimeFigureOut">
               <a:rPr lang="en-US" smtClean="0"/>
               <a:pPr/>
-              <a:t>3/1/2024</a:t>
+              <a:t>3/2/2024</a:t>
             </a:fld>
             <a:endParaRPr lang="en-US"/>
           </a:p>
@@ -2106,10 +2090,9 @@
           </a:lstStyle>
           <a:p>
             <a:r>
-              <a:rPr lang="en-US" smtClean="0"/>
+              <a:rPr lang="en-US"/>
               <a:t>Click to edit Master title style</a:t>
             </a:r>
-            <a:endParaRPr lang="en-US"/>
           </a:p>
         </p:txBody>
       </p:sp>
@@ -2163,38 +2146,37 @@
           <a:p>
             <a:pPr lvl="0"/>
             <a:r>
-              <a:rPr lang="en-US" smtClean="0"/>
+              <a:rPr lang="en-US"/>
               <a:t>Click to edit Master text styles</a:t>
             </a:r>
           </a:p>
           <a:p>
             <a:pPr lvl="1"/>
             <a:r>
-              <a:rPr lang="en-US" smtClean="0"/>
+              <a:rPr lang="en-US"/>
               <a:t>Second level</a:t>
             </a:r>
           </a:p>
           <a:p>
             <a:pPr lvl="2"/>
             <a:r>
-              <a:rPr lang="en-US" smtClean="0"/>
+              <a:rPr lang="en-US"/>
               <a:t>Third level</a:t>
             </a:r>
           </a:p>
           <a:p>
             <a:pPr lvl="3"/>
             <a:r>
-              <a:rPr lang="en-US" smtClean="0"/>
+              <a:rPr lang="en-US"/>
               <a:t>Fourth level</a:t>
             </a:r>
           </a:p>
           <a:p>
             <a:pPr lvl="4"/>
             <a:r>
-              <a:rPr lang="en-US" smtClean="0"/>
+              <a:rPr lang="en-US"/>
               <a:t>Fifth level</a:t>
             </a:r>
-            <a:endParaRPr lang="en-US"/>
           </a:p>
         </p:txBody>
       </p:sp>
@@ -2257,7 +2239,7 @@
           <a:p>
             <a:pPr lvl="0"/>
             <a:r>
-              <a:rPr lang="en-US" smtClean="0"/>
+              <a:rPr lang="en-US"/>
               <a:t>Click to edit Master text styles</a:t>
             </a:r>
           </a:p>
@@ -2281,7 +2263,7 @@
             <a:fld id="{1D8BD707-D9CF-40AE-B4C6-C98DA3205C09}" type="datetimeFigureOut">
               <a:rPr lang="en-US" smtClean="0"/>
               <a:pPr/>
-              <a:t>3/1/2024</a:t>
+              <a:t>3/2/2024</a:t>
             </a:fld>
             <a:endParaRPr lang="en-US"/>
           </a:p>
@@ -2380,10 +2362,9 @@
           </a:lstStyle>
           <a:p>
             <a:r>
-              <a:rPr lang="en-US" smtClean="0"/>
+              <a:rPr lang="en-US"/>
               <a:t>Click to edit Master title style</a:t>
             </a:r>
-            <a:endParaRPr lang="en-US"/>
           </a:p>
         </p:txBody>
       </p:sp>
@@ -2507,7 +2488,7 @@
           <a:p>
             <a:pPr lvl="0"/>
             <a:r>
-              <a:rPr lang="en-US" smtClean="0"/>
+              <a:rPr lang="en-US"/>
               <a:t>Click to edit Master text styles</a:t>
             </a:r>
           </a:p>
@@ -2531,7 +2512,7 @@
             <a:fld id="{1D8BD707-D9CF-40AE-B4C6-C98DA3205C09}" type="datetimeFigureOut">
               <a:rPr lang="en-US" smtClean="0"/>
               <a:pPr/>
-              <a:t>3/1/2024</a:t>
+              <a:t>3/2/2024</a:t>
             </a:fld>
             <a:endParaRPr lang="en-US"/>
           </a:p>
@@ -2636,10 +2617,9 @@
           <a:lstStyle/>
           <a:p>
             <a:r>
-              <a:rPr lang="en-US" smtClean="0"/>
+              <a:rPr lang="en-US"/>
               <a:t>Click to edit Master title style</a:t>
             </a:r>
-            <a:endParaRPr lang="en-US"/>
           </a:p>
         </p:txBody>
       </p:sp>
@@ -2670,38 +2650,37 @@
           <a:p>
             <a:pPr lvl="0"/>
             <a:r>
-              <a:rPr lang="en-US" smtClean="0"/>
+              <a:rPr lang="en-US"/>
               <a:t>Click to edit Master text styles</a:t>
             </a:r>
           </a:p>
           <a:p>
             <a:pPr lvl="1"/>
             <a:r>
-              <a:rPr lang="en-US" smtClean="0"/>
+              <a:rPr lang="en-US"/>
               <a:t>Second level</a:t>
             </a:r>
           </a:p>
           <a:p>
             <a:pPr lvl="2"/>
             <a:r>
-              <a:rPr lang="en-US" smtClean="0"/>
+              <a:rPr lang="en-US"/>
               <a:t>Third level</a:t>
             </a:r>
           </a:p>
           <a:p>
             <a:pPr lvl="3"/>
             <a:r>
-              <a:rPr lang="en-US" smtClean="0"/>
+              <a:rPr lang="en-US"/>
               <a:t>Fourth level</a:t>
             </a:r>
           </a:p>
           <a:p>
             <a:pPr lvl="4"/>
             <a:r>
-              <a:rPr lang="en-US" smtClean="0"/>
+              <a:rPr lang="en-US"/>
               <a:t>Fifth level</a:t>
             </a:r>
-            <a:endParaRPr lang="en-US"/>
           </a:p>
         </p:txBody>
       </p:sp>
@@ -2741,7 +2720,7 @@
             <a:fld id="{1D8BD707-D9CF-40AE-B4C6-C98DA3205C09}" type="datetimeFigureOut">
               <a:rPr lang="en-US" smtClean="0"/>
               <a:pPr/>
-              <a:t>3/1/2024</a:t>
+              <a:t>3/2/2024</a:t>
             </a:fld>
             <a:endParaRPr lang="en-US"/>
           </a:p>
@@ -3323,15 +3302,15 @@
         </p:nvSpPr>
         <p:spPr>
           <a:xfrm>
-            <a:off x="2224837" y="4130263"/>
-            <a:ext cx="12616379" cy="1781159"/>
+            <a:off x="814373" y="3460488"/>
+            <a:ext cx="13335015" cy="3058530"/>
           </a:xfrm>
           <a:prstGeom prst="rect">
             <a:avLst/>
           </a:prstGeom>
         </p:spPr>
         <p:txBody>
-          <a:bodyPr lIns="0" tIns="0" rIns="0" bIns="0" rtlCol="0" anchor="t">
+          <a:bodyPr wrap="square" lIns="0" tIns="0" rIns="0" bIns="0" rtlCol="0" anchor="t">
             <a:spAutoFit/>
           </a:bodyPr>
           <a:lstStyle/>
@@ -3342,14 +3321,29 @@
               </a:lnSpc>
             </a:pPr>
             <a:r>
-              <a:rPr lang="en-US" sz="12000" spc="600">
+              <a:rPr lang="pt-BR" sz="6000" spc="600" dirty="0">
                 <a:solidFill>
                   <a:srgbClr val="2B4A9D"/>
                 </a:solidFill>
                 <a:latin typeface="Poppins Bold"/>
               </a:rPr>
-              <a:t>FLUTTER</a:t>
-            </a:r>
+              <a:t>Ambiente de Desenvolvimento do </a:t>
+            </a:r>
+            <a:r>
+              <a:rPr lang="pt-BR" sz="6000" spc="600" dirty="0" err="1">
+                <a:solidFill>
+                  <a:srgbClr val="2B4A9D"/>
+                </a:solidFill>
+                <a:latin typeface="Poppins Bold"/>
+              </a:rPr>
+              <a:t>Flutter</a:t>
+            </a:r>
+            <a:endParaRPr lang="en-US" sz="6000" spc="600" dirty="0">
+              <a:solidFill>
+                <a:srgbClr val="2B4A9D"/>
+              </a:solidFill>
+              <a:latin typeface="Poppins Bold"/>
+            </a:endParaRPr>
           </a:p>
         </p:txBody>
       </p:sp>
@@ -3361,7 +3355,7 @@
         </p:nvSpPr>
         <p:spPr>
           <a:xfrm>
-            <a:off x="2224837" y="7250862"/>
+            <a:off x="814373" y="7555634"/>
             <a:ext cx="10419822" cy="1225550"/>
           </a:xfrm>
           <a:prstGeom prst="rect">
@@ -3434,7 +3428,7 @@
               <a:alphaModFix amt="69000"/>
               <a:extLst>
                 <a:ext uri="{96DAC541-7B7A-43D3-8B79-37D633B846F1}">
-                  <asvg:svgBlip xmlns:asvg="http://schemas.microsoft.com/office/drawing/2016/SVG/main" xmlns="" r:embed="rId3"/>
+                  <asvg:svgBlip xmlns:asvg="http://schemas.microsoft.com/office/drawing/2016/SVG/main" r:embed="rId3"/>
                 </a:ext>
               </a:extLst>
             </a:blip>
@@ -3504,13 +3498,6 @@
   <p:clrMapOvr>
     <a:masterClrMapping/>
   </p:clrMapOvr>
-  <p:timing>
-    <p:tnLst>
-      <p:par>
-        <p:cTn id="1" dur="indefinite" restart="never" nodeType="tmRoot"/>
-      </p:par>
-    </p:tnLst>
-  </p:timing>
 </p:sld>
 </file>
 
@@ -4141,166 +4128,6 @@
           </p:spPr>
         </p:sp>
       </p:grpSp>
-      <p:grpSp>
-        <p:nvGrpSpPr>
-          <p:cNvPr id="19" name="Group 19"/>
-          <p:cNvGrpSpPr/>
-          <p:nvPr/>
-        </p:nvGrpSpPr>
-        <p:grpSpPr>
-          <a:xfrm rot="-5400000">
-            <a:off x="568482" y="5213428"/>
-            <a:ext cx="829509" cy="1966473"/>
-            <a:chOff x="0" y="0"/>
-            <a:chExt cx="2354580" cy="5581882"/>
-          </a:xfrm>
-        </p:grpSpPr>
-        <p:sp>
-          <p:nvSpPr>
-            <p:cNvPr id="20" name="Freeform 20"/>
-            <p:cNvSpPr/>
-            <p:nvPr/>
-          </p:nvSpPr>
-          <p:spPr>
-            <a:xfrm>
-              <a:off x="0" y="0"/>
-              <a:ext cx="2353310" cy="5581882"/>
-            </a:xfrm>
-            <a:custGeom>
-              <a:avLst/>
-              <a:gdLst/>
-              <a:ahLst/>
-              <a:cxnLst/>
-              <a:rect l="l" t="t" r="r" b="b"/>
-              <a:pathLst>
-                <a:path w="2353310" h="5581882">
-                  <a:moveTo>
-                    <a:pt x="784860" y="5514572"/>
-                  </a:moveTo>
-                  <a:cubicBezTo>
-                    <a:pt x="905510" y="5555212"/>
-                    <a:pt x="1042670" y="5581882"/>
-                    <a:pt x="1177290" y="5581882"/>
-                  </a:cubicBezTo>
-                  <a:cubicBezTo>
-                    <a:pt x="1311910" y="5581882"/>
-                    <a:pt x="1441450" y="5559022"/>
-                    <a:pt x="1560830" y="5518382"/>
-                  </a:cubicBezTo>
-                  <a:cubicBezTo>
-                    <a:pt x="1563370" y="5517112"/>
-                    <a:pt x="1565910" y="5517112"/>
-                    <a:pt x="1568450" y="5515842"/>
-                  </a:cubicBezTo>
-                  <a:cubicBezTo>
-                    <a:pt x="2016760" y="5353282"/>
-                    <a:pt x="2346960" y="4924022"/>
-                    <a:pt x="2353310" y="4414024"/>
-                  </a:cubicBezTo>
-                  <a:lnTo>
-                    <a:pt x="2353310" y="0"/>
-                  </a:lnTo>
-                  <a:lnTo>
-                    <a:pt x="0" y="0"/>
-                  </a:lnTo>
-                  <a:lnTo>
-                    <a:pt x="0" y="4410668"/>
-                  </a:lnTo>
-                  <a:cubicBezTo>
-                    <a:pt x="6350" y="4926562"/>
-                    <a:pt x="331470" y="5355822"/>
-                    <a:pt x="784860" y="5514572"/>
-                  </a:cubicBezTo>
-                  <a:close/>
-                </a:path>
-              </a:pathLst>
-            </a:custGeom>
-            <a:solidFill>
-              <a:srgbClr val="2B4A9D"/>
-            </a:solidFill>
-          </p:spPr>
-        </p:sp>
-      </p:grpSp>
-      <p:grpSp>
-        <p:nvGrpSpPr>
-          <p:cNvPr id="21" name="Group 21"/>
-          <p:cNvGrpSpPr/>
-          <p:nvPr/>
-        </p:nvGrpSpPr>
-        <p:grpSpPr>
-          <a:xfrm rot="-5400000">
-            <a:off x="568482" y="6542700"/>
-            <a:ext cx="829509" cy="1966473"/>
-            <a:chOff x="0" y="0"/>
-            <a:chExt cx="2354580" cy="5581882"/>
-          </a:xfrm>
-        </p:grpSpPr>
-        <p:sp>
-          <p:nvSpPr>
-            <p:cNvPr id="22" name="Freeform 22"/>
-            <p:cNvSpPr/>
-            <p:nvPr/>
-          </p:nvSpPr>
-          <p:spPr>
-            <a:xfrm>
-              <a:off x="0" y="0"/>
-              <a:ext cx="2353310" cy="5581882"/>
-            </a:xfrm>
-            <a:custGeom>
-              <a:avLst/>
-              <a:gdLst/>
-              <a:ahLst/>
-              <a:cxnLst/>
-              <a:rect l="l" t="t" r="r" b="b"/>
-              <a:pathLst>
-                <a:path w="2353310" h="5581882">
-                  <a:moveTo>
-                    <a:pt x="784860" y="5514572"/>
-                  </a:moveTo>
-                  <a:cubicBezTo>
-                    <a:pt x="905510" y="5555212"/>
-                    <a:pt x="1042670" y="5581882"/>
-                    <a:pt x="1177290" y="5581882"/>
-                  </a:cubicBezTo>
-                  <a:cubicBezTo>
-                    <a:pt x="1311910" y="5581882"/>
-                    <a:pt x="1441450" y="5559022"/>
-                    <a:pt x="1560830" y="5518382"/>
-                  </a:cubicBezTo>
-                  <a:cubicBezTo>
-                    <a:pt x="1563370" y="5517112"/>
-                    <a:pt x="1565910" y="5517112"/>
-                    <a:pt x="1568450" y="5515842"/>
-                  </a:cubicBezTo>
-                  <a:cubicBezTo>
-                    <a:pt x="2016760" y="5353282"/>
-                    <a:pt x="2346960" y="4924022"/>
-                    <a:pt x="2353310" y="4414024"/>
-                  </a:cubicBezTo>
-                  <a:lnTo>
-                    <a:pt x="2353310" y="0"/>
-                  </a:lnTo>
-                  <a:lnTo>
-                    <a:pt x="0" y="0"/>
-                  </a:lnTo>
-                  <a:lnTo>
-                    <a:pt x="0" y="4410668"/>
-                  </a:lnTo>
-                  <a:cubicBezTo>
-                    <a:pt x="6350" y="4926562"/>
-                    <a:pt x="331470" y="5355822"/>
-                    <a:pt x="784860" y="5514572"/>
-                  </a:cubicBezTo>
-                  <a:close/>
-                </a:path>
-              </a:pathLst>
-            </a:custGeom>
-            <a:solidFill>
-              <a:srgbClr val="2B4A9D"/>
-            </a:solidFill>
-          </p:spPr>
-        </p:sp>
-      </p:grpSp>
       <p:sp>
         <p:nvSpPr>
           <p:cNvPr id="23" name="TextBox 23"/>
@@ -4382,13 +4209,6 @@
   <p:clrMapOvr>
     <a:masterClrMapping/>
   </p:clrMapOvr>
-  <p:timing>
-    <p:tnLst>
-      <p:par>
-        <p:cTn id="1" dur="indefinite" restart="never" nodeType="tmRoot"/>
-      </p:par>
-    </p:tnLst>
-  </p:timing>
 </p:sld>
 </file>
 
@@ -4941,13 +4761,6 @@
   <p:clrMapOvr>
     <a:masterClrMapping/>
   </p:clrMapOvr>
-  <p:timing>
-    <p:tnLst>
-      <p:par>
-        <p:cTn id="1" dur="indefinite" restart="never" nodeType="tmRoot"/>
-      </p:par>
-    </p:tnLst>
-  </p:timing>
 </p:sld>
 </file>
 
@@ -5215,13 +5028,6 @@
   <p:clrMapOvr>
     <a:masterClrMapping/>
   </p:clrMapOvr>
-  <p:timing>
-    <p:tnLst>
-      <p:par>
-        <p:cTn id="1" dur="indefinite" restart="never" nodeType="tmRoot"/>
-      </p:par>
-    </p:tnLst>
-  </p:timing>
 </p:sld>
 </file>
 
@@ -5389,13 +5195,6 @@
   <p:clrMapOvr>
     <a:masterClrMapping/>
   </p:clrMapOvr>
-  <p:timing>
-    <p:tnLst>
-      <p:par>
-        <p:cTn id="1" dur="indefinite" restart="never" nodeType="tmRoot"/>
-      </p:par>
-    </p:tnLst>
-  </p:timing>
 </p:sld>
 </file>
 
@@ -5519,13 +5318,6 @@
   <p:clrMapOvr>
     <a:masterClrMapping/>
   </p:clrMapOvr>
-  <p:timing>
-    <p:tnLst>
-      <p:par>
-        <p:cTn id="1" dur="indefinite" restart="never" nodeType="tmRoot"/>
-      </p:par>
-    </p:tnLst>
-  </p:timing>
 </p:sld>
 </file>
 
@@ -5637,13 +5429,6 @@
   <p:clrMapOvr>
     <a:masterClrMapping/>
   </p:clrMapOvr>
-  <p:timing>
-    <p:tnLst>
-      <p:par>
-        <p:cTn id="1" dur="indefinite" restart="never" nodeType="tmRoot"/>
-      </p:par>
-    </p:tnLst>
-  </p:timing>
 </p:sld>
 </file>
 
@@ -5795,13 +5580,6 @@
   <p:clrMapOvr>
     <a:masterClrMapping/>
   </p:clrMapOvr>
-  <p:timing>
-    <p:tnLst>
-      <p:par>
-        <p:cTn id="1" dur="indefinite" restart="never" nodeType="tmRoot"/>
-      </p:par>
-    </p:tnLst>
-  </p:timing>
 </p:sld>
 </file>
 
@@ -5873,13 +5651,6 @@
   <p:clrMapOvr>
     <a:masterClrMapping/>
   </p:clrMapOvr>
-  <p:timing>
-    <p:tnLst>
-      <p:par>
-        <p:cTn id="1" dur="indefinite" restart="never" nodeType="tmRoot"/>
-      </p:par>
-    </p:tnLst>
-  </p:timing>
 </p:sld>
 </file>
 

</xml_diff>